<commit_message>
removed upper() in script
</commit_message>
<xml_diff>
--- a/Docs/Course_PPT.pptx
+++ b/Docs/Course_PPT.pptx
@@ -267,7 +267,7 @@
           <a:p>
             <a:fld id="{7A9D29DF-778E-44DE-9BEF-944311ECE76F}" type="datetimeFigureOut">
               <a:rPr lang="en-IN" smtClean="0"/>
-              <a:t>16-04-2018</a:t>
+              <a:t>23-05-2018</a:t>
             </a:fld>
             <a:endParaRPr lang="en-IN"/>
           </a:p>
@@ -2671,7 +2671,7 @@
             <a:fld id="{1D8BD707-D9CF-40AE-B4C6-C98DA3205C09}" type="datetimeFigureOut">
               <a:rPr lang="en-US" smtClean="0"/>
               <a:pPr/>
-              <a:t>4/16/2018</a:t>
+              <a:t>5/23/2018</a:t>
             </a:fld>
             <a:endParaRPr lang="en-US"/>
           </a:p>
@@ -2838,7 +2838,7 @@
             <a:fld id="{1D8BD707-D9CF-40AE-B4C6-C98DA3205C09}" type="datetimeFigureOut">
               <a:rPr lang="en-US" smtClean="0"/>
               <a:pPr/>
-              <a:t>4/16/2018</a:t>
+              <a:t>5/23/2018</a:t>
             </a:fld>
             <a:endParaRPr lang="en-US"/>
           </a:p>
@@ -3015,7 +3015,7 @@
             <a:fld id="{1D8BD707-D9CF-40AE-B4C6-C98DA3205C09}" type="datetimeFigureOut">
               <a:rPr lang="en-US" smtClean="0"/>
               <a:pPr/>
-              <a:t>4/16/2018</a:t>
+              <a:t>5/23/2018</a:t>
             </a:fld>
             <a:endParaRPr lang="en-US"/>
           </a:p>
@@ -3182,7 +3182,7 @@
             <a:fld id="{1D8BD707-D9CF-40AE-B4C6-C98DA3205C09}" type="datetimeFigureOut">
               <a:rPr lang="en-US" smtClean="0"/>
               <a:pPr/>
-              <a:t>4/16/2018</a:t>
+              <a:t>5/23/2018</a:t>
             </a:fld>
             <a:endParaRPr lang="en-US"/>
           </a:p>
@@ -3425,7 +3425,7 @@
             <a:fld id="{1D8BD707-D9CF-40AE-B4C6-C98DA3205C09}" type="datetimeFigureOut">
               <a:rPr lang="en-US" smtClean="0"/>
               <a:pPr/>
-              <a:t>4/16/2018</a:t>
+              <a:t>5/23/2018</a:t>
             </a:fld>
             <a:endParaRPr lang="en-US"/>
           </a:p>
@@ -3710,7 +3710,7 @@
             <a:fld id="{1D8BD707-D9CF-40AE-B4C6-C98DA3205C09}" type="datetimeFigureOut">
               <a:rPr lang="en-US" smtClean="0"/>
               <a:pPr/>
-              <a:t>4/16/2018</a:t>
+              <a:t>5/23/2018</a:t>
             </a:fld>
             <a:endParaRPr lang="en-US"/>
           </a:p>
@@ -4129,7 +4129,7 @@
             <a:fld id="{1D8BD707-D9CF-40AE-B4C6-C98DA3205C09}" type="datetimeFigureOut">
               <a:rPr lang="en-US" smtClean="0"/>
               <a:pPr/>
-              <a:t>4/16/2018</a:t>
+              <a:t>5/23/2018</a:t>
             </a:fld>
             <a:endParaRPr lang="en-US"/>
           </a:p>
@@ -4244,7 +4244,7 @@
             <a:fld id="{1D8BD707-D9CF-40AE-B4C6-C98DA3205C09}" type="datetimeFigureOut">
               <a:rPr lang="en-US" smtClean="0"/>
               <a:pPr/>
-              <a:t>4/16/2018</a:t>
+              <a:t>5/23/2018</a:t>
             </a:fld>
             <a:endParaRPr lang="en-US"/>
           </a:p>
@@ -4336,7 +4336,7 @@
             <a:fld id="{1D8BD707-D9CF-40AE-B4C6-C98DA3205C09}" type="datetimeFigureOut">
               <a:rPr lang="en-US" smtClean="0"/>
               <a:pPr/>
-              <a:t>4/16/2018</a:t>
+              <a:t>5/23/2018</a:t>
             </a:fld>
             <a:endParaRPr lang="en-US"/>
           </a:p>
@@ -4610,7 +4610,7 @@
             <a:fld id="{1D8BD707-D9CF-40AE-B4C6-C98DA3205C09}" type="datetimeFigureOut">
               <a:rPr lang="en-US" smtClean="0"/>
               <a:pPr/>
-              <a:t>4/16/2018</a:t>
+              <a:t>5/23/2018</a:t>
             </a:fld>
             <a:endParaRPr lang="en-US"/>
           </a:p>
@@ -4860,7 +4860,7 @@
             <a:fld id="{1D8BD707-D9CF-40AE-B4C6-C98DA3205C09}" type="datetimeFigureOut">
               <a:rPr lang="en-US" smtClean="0"/>
               <a:pPr/>
-              <a:t>4/16/2018</a:t>
+              <a:t>5/23/2018</a:t>
             </a:fld>
             <a:endParaRPr lang="en-US"/>
           </a:p>
@@ -5070,7 +5070,7 @@
             <a:fld id="{1D8BD707-D9CF-40AE-B4C6-C98DA3205C09}" type="datetimeFigureOut">
               <a:rPr lang="en-US" smtClean="0"/>
               <a:pPr/>
-              <a:t>4/16/2018</a:t>
+              <a:t>5/23/2018</a:t>
             </a:fld>
             <a:endParaRPr lang="en-US"/>
           </a:p>

</xml_diff>